<commit_message>
ModEM documentation updated: the GJI paper added, also a user/developer manual (in misc) and the user guide updated. Also need to check that the 2D MT MPI works.
</commit_message>
<xml_diff>
--- a/doc/pics/ModularSystemFinal.pptx
+++ b/doc/pics/ModularSystemFinal.pptx
@@ -247,7 +247,7 @@
               <a:pPr>
                 <a:defRPr/>
               </a:pPr>
-              <a:t>8/31/2010</a:t>
+              <a:t>9/16/2011</a:t>
             </a:fld>
             <a:endParaRPr lang="en-US" dirty="0"/>
           </a:p>
@@ -595,6 +595,10 @@
           </p:nvPr>
         </p:nvSpPr>
         <p:spPr bwMode="auto">
+          <a:xfrm>
+            <a:off x="2162175" y="698500"/>
+            <a:ext cx="2622550" cy="3495675"/>
+          </a:xfrm>
           <a:noFill/>
           <a:ln>
             <a:solidFill>
@@ -697,7 +701,7 @@
         </p:nvSpPr>
         <p:spPr>
           <a:xfrm>
-            <a:off x="514350" y="2840569"/>
+            <a:off x="514350" y="2840570"/>
             <a:ext cx="5829300" cy="1960033"/>
           </a:xfrm>
         </p:spPr>
@@ -859,7 +863,7 @@
               <a:pPr>
                 <a:defRPr/>
               </a:pPr>
-              <a:t>8/31/2010</a:t>
+              <a:t>9/16/2011</a:t>
             </a:fld>
             <a:endParaRPr lang="en-US" dirty="0"/>
           </a:p>
@@ -1051,7 +1055,7 @@
               <a:pPr>
                 <a:defRPr/>
               </a:pPr>
-              <a:t>8/31/2010</a:t>
+              <a:t>9/16/2011</a:t>
             </a:fld>
             <a:endParaRPr lang="en-US" dirty="0"/>
           </a:p>
@@ -1153,7 +1157,7 @@
         </p:nvSpPr>
         <p:spPr>
           <a:xfrm>
-            <a:off x="4972050" y="366186"/>
+            <a:off x="4972050" y="366187"/>
             <a:ext cx="1543050" cy="7802033"/>
           </a:xfrm>
         </p:spPr>
@@ -1181,7 +1185,7 @@
         </p:nvSpPr>
         <p:spPr>
           <a:xfrm>
-            <a:off x="342900" y="366186"/>
+            <a:off x="342900" y="366187"/>
             <a:ext cx="4514850" cy="7802033"/>
           </a:xfrm>
         </p:spPr>
@@ -1253,7 +1257,7 @@
               <a:pPr>
                 <a:defRPr/>
               </a:pPr>
-              <a:t>8/31/2010</a:t>
+              <a:t>9/16/2011</a:t>
             </a:fld>
             <a:endParaRPr lang="en-US" dirty="0"/>
           </a:p>
@@ -1445,7 +1449,7 @@
               <a:pPr>
                 <a:defRPr/>
               </a:pPr>
-              <a:t>8/31/2010</a:t>
+              <a:t>9/16/2011</a:t>
             </a:fld>
             <a:endParaRPr lang="en-US" dirty="0"/>
           </a:p>
@@ -1579,7 +1583,7 @@
         </p:nvSpPr>
         <p:spPr>
           <a:xfrm>
-            <a:off x="541735" y="3875620"/>
+            <a:off x="541735" y="3875621"/>
             <a:ext cx="5829300" cy="2000249"/>
           </a:xfrm>
         </p:spPr>
@@ -1713,7 +1717,7 @@
               <a:pPr>
                 <a:defRPr/>
               </a:pPr>
-              <a:t>8/31/2010</a:t>
+              <a:t>9/16/2011</a:t>
             </a:fld>
             <a:endParaRPr lang="en-US" dirty="0"/>
           </a:p>
@@ -1838,7 +1842,7 @@
         </p:nvSpPr>
         <p:spPr>
           <a:xfrm>
-            <a:off x="342900" y="2133602"/>
+            <a:off x="342900" y="2133604"/>
             <a:ext cx="3028950" cy="6034617"/>
           </a:xfrm>
         </p:spPr>
@@ -1923,7 +1927,7 @@
         </p:nvSpPr>
         <p:spPr>
           <a:xfrm>
-            <a:off x="3486150" y="2133602"/>
+            <a:off x="3486150" y="2133604"/>
             <a:ext cx="3028950" cy="6034617"/>
           </a:xfrm>
         </p:spPr>
@@ -2023,7 +2027,7 @@
               <a:pPr>
                 <a:defRPr/>
               </a:pPr>
-              <a:t>8/31/2010</a:t>
+              <a:t>9/16/2011</a:t>
             </a:fld>
             <a:endParaRPr lang="en-US" dirty="0"/>
           </a:p>
@@ -2152,7 +2156,7 @@
         </p:nvSpPr>
         <p:spPr>
           <a:xfrm>
-            <a:off x="342901" y="2046817"/>
+            <a:off x="342902" y="2046817"/>
             <a:ext cx="3030141" cy="853016"/>
           </a:xfrm>
         </p:spPr>
@@ -2217,7 +2221,7 @@
         </p:nvSpPr>
         <p:spPr>
           <a:xfrm>
-            <a:off x="342901" y="2899833"/>
+            <a:off x="342902" y="2899833"/>
             <a:ext cx="3030141" cy="5268384"/>
           </a:xfrm>
         </p:spPr>
@@ -2302,7 +2306,7 @@
         </p:nvSpPr>
         <p:spPr>
           <a:xfrm>
-            <a:off x="3483770" y="2046817"/>
+            <a:off x="3483771" y="2046817"/>
             <a:ext cx="3031331" cy="853016"/>
           </a:xfrm>
         </p:spPr>
@@ -2367,7 +2371,7 @@
         </p:nvSpPr>
         <p:spPr>
           <a:xfrm>
-            <a:off x="3483770" y="2899833"/>
+            <a:off x="3483771" y="2899833"/>
             <a:ext cx="3031331" cy="5268384"/>
           </a:xfrm>
         </p:spPr>
@@ -2467,7 +2471,7 @@
               <a:pPr>
                 <a:defRPr/>
               </a:pPr>
-              <a:t>8/31/2010</a:t>
+              <a:t>9/16/2011</a:t>
             </a:fld>
             <a:endParaRPr lang="en-US" dirty="0"/>
           </a:p>
@@ -2607,7 +2611,7 @@
               <a:pPr>
                 <a:defRPr/>
               </a:pPr>
-              <a:t>8/31/2010</a:t>
+              <a:t>9/16/2011</a:t>
             </a:fld>
             <a:endParaRPr lang="en-US" dirty="0"/>
           </a:p>
@@ -2724,7 +2728,7 @@
               <a:pPr>
                 <a:defRPr/>
               </a:pPr>
-              <a:t>8/31/2010</a:t>
+              <a:t>9/16/2011</a:t>
             </a:fld>
             <a:endParaRPr lang="en-US" dirty="0"/>
           </a:p>
@@ -2826,7 +2830,7 @@
         </p:nvSpPr>
         <p:spPr>
           <a:xfrm>
-            <a:off x="342901" y="364067"/>
+            <a:off x="342902" y="364067"/>
             <a:ext cx="2256235" cy="1549400"/>
           </a:xfrm>
         </p:spPr>
@@ -2858,7 +2862,7 @@
         </p:nvSpPr>
         <p:spPr>
           <a:xfrm>
-            <a:off x="2681288" y="364069"/>
+            <a:off x="2681289" y="364070"/>
             <a:ext cx="3833813" cy="7804151"/>
           </a:xfrm>
         </p:spPr>
@@ -2943,7 +2947,7 @@
         </p:nvSpPr>
         <p:spPr>
           <a:xfrm>
-            <a:off x="342901" y="1913468"/>
+            <a:off x="342902" y="1913470"/>
             <a:ext cx="2256235" cy="6254751"/>
           </a:xfrm>
         </p:spPr>
@@ -3023,7 +3027,7 @@
               <a:pPr>
                 <a:defRPr/>
               </a:pPr>
-              <a:t>8/31/2010</a:t>
+              <a:t>9/16/2011</a:t>
             </a:fld>
             <a:endParaRPr lang="en-US" dirty="0"/>
           </a:p>
@@ -3301,7 +3305,7 @@
               <a:pPr>
                 <a:defRPr/>
               </a:pPr>
-              <a:t>8/31/2010</a:t>
+              <a:t>9/16/2011</a:t>
             </a:fld>
             <a:endParaRPr lang="en-US" dirty="0"/>
           </a:p>
@@ -3520,7 +3524,7 @@
         </p:nvSpPr>
         <p:spPr>
           <a:xfrm>
-            <a:off x="342900" y="8475663"/>
+            <a:off x="342900" y="8475665"/>
             <a:ext cx="1600200" cy="485775"/>
           </a:xfrm>
           <a:prstGeom prst="rect">
@@ -3556,7 +3560,7 @@
               <a:pPr>
                 <a:defRPr/>
               </a:pPr>
-              <a:t>8/31/2010</a:t>
+              <a:t>9/16/2011</a:t>
             </a:fld>
             <a:endParaRPr lang="en-US" dirty="0"/>
           </a:p>
@@ -3574,7 +3578,7 @@
         </p:nvSpPr>
         <p:spPr>
           <a:xfrm>
-            <a:off x="2343150" y="8475663"/>
+            <a:off x="2343150" y="8475665"/>
             <a:ext cx="2171700" cy="485775"/>
           </a:xfrm>
           <a:prstGeom prst="rect">
@@ -3621,7 +3625,7 @@
         </p:nvSpPr>
         <p:spPr>
           <a:xfrm>
-            <a:off x="4914900" y="8475663"/>
+            <a:off x="4914900" y="8475665"/>
             <a:ext cx="1600200" cy="485775"/>
           </a:xfrm>
           <a:prstGeom prst="rect">
@@ -4334,7 +4338,7 @@
         <p:spPr bwMode="auto">
           <a:xfrm>
             <a:off x="2209800" y="7924800"/>
-            <a:ext cx="2514600" cy="369888"/>
+            <a:ext cx="2514600" cy="338554"/>
           </a:xfrm>
           <a:prstGeom prst="rect">
             <a:avLst/>
@@ -4359,11 +4363,14 @@
               </a:spcBef>
             </a:pPr>
             <a:r>
-              <a:rPr lang="en-US" dirty="0">
+              <a:rPr lang="en-US" sz="1600" b="1" dirty="0" smtClean="0">
                 <a:latin typeface="Calibri" pitchFamily="34" charset="0"/>
               </a:rPr>
-              <a:t>ModelSpace</a:t>
-            </a:r>
+              <a:t>Model Space</a:t>
+            </a:r>
+            <a:endParaRPr lang="en-US" sz="1600" b="1" dirty="0">
+              <a:latin typeface="Calibri" pitchFamily="34" charset="0"/>
+            </a:endParaRPr>
           </a:p>
         </p:txBody>
       </p:sp>
@@ -4378,7 +4385,7 @@
         <p:spPr bwMode="auto">
           <a:xfrm>
             <a:off x="5638800" y="8153400"/>
-            <a:ext cx="895350" cy="369888"/>
+            <a:ext cx="895350" cy="369332"/>
           </a:xfrm>
           <a:prstGeom prst="rect">
             <a:avLst/>
@@ -4431,7 +4438,7 @@
         <p:spPr bwMode="auto">
           <a:xfrm>
             <a:off x="2819400" y="457200"/>
-            <a:ext cx="1238250" cy="369888"/>
+            <a:ext cx="1238250" cy="338554"/>
           </a:xfrm>
           <a:prstGeom prst="rect">
             <a:avLst/>
@@ -4456,11 +4463,14 @@
               </a:spcBef>
             </a:pPr>
             <a:r>
-              <a:rPr lang="en-US" dirty="0">
+              <a:rPr lang="en-US" sz="1600" b="1" dirty="0" smtClean="0">
                 <a:latin typeface="Calibri" pitchFamily="34" charset="0"/>
               </a:rPr>
-              <a:t>DataSpace</a:t>
-            </a:r>
+              <a:t>Data Space</a:t>
+            </a:r>
+            <a:endParaRPr lang="en-US" sz="1600" b="1" dirty="0">
+              <a:latin typeface="Calibri" pitchFamily="34" charset="0"/>
+            </a:endParaRPr>
           </a:p>
         </p:txBody>
       </p:sp>
@@ -4474,8 +4484,8 @@
         </p:nvSpPr>
         <p:spPr bwMode="auto">
           <a:xfrm>
-            <a:off x="5867400" y="685800"/>
-            <a:ext cx="358775" cy="369888"/>
+            <a:off x="5867401" y="685800"/>
+            <a:ext cx="358775" cy="369332"/>
           </a:xfrm>
           <a:prstGeom prst="rect">
             <a:avLst/>
@@ -4525,8 +4535,8 @@
         </p:nvCxnSpPr>
         <p:spPr>
           <a:xfrm>
-            <a:off x="2209800" y="2743200"/>
-            <a:ext cx="304800" cy="1588"/>
+            <a:off x="2162175" y="2819400"/>
+            <a:ext cx="419100" cy="9525"/>
           </a:xfrm>
           <a:prstGeom prst="straightConnector1">
             <a:avLst/>
@@ -4560,9 +4570,9 @@
           <p:nvPr/>
         </p:nvCxnSpPr>
         <p:spPr>
-          <a:xfrm rot="16200000" flipH="1">
-            <a:off x="641350" y="1797050"/>
-            <a:ext cx="1311275" cy="3175"/>
+          <a:xfrm flipH="1">
+            <a:off x="1276350" y="1057275"/>
+            <a:ext cx="9525" cy="1495425"/>
           </a:xfrm>
           <a:prstGeom prst="straightConnector1">
             <a:avLst/>
@@ -4599,8 +4609,8 @@
         </p:nvSpPr>
         <p:spPr bwMode="auto">
           <a:xfrm>
-            <a:off x="4038600" y="2667000"/>
-            <a:ext cx="261938" cy="369888"/>
+            <a:off x="4038600" y="2514600"/>
+            <a:ext cx="261938" cy="369332"/>
           </a:xfrm>
           <a:prstGeom prst="rect">
             <a:avLst/>
@@ -4625,7 +4635,7 @@
               </a:spcBef>
             </a:pPr>
             <a:r>
-              <a:rPr lang="en-US" b="1">
+              <a:rPr lang="en-US" b="1" dirty="0">
                 <a:solidFill>
                   <a:schemeClr val="accent2"/>
                 </a:solidFill>
@@ -4633,7 +4643,7 @@
               </a:rPr>
               <a:t>J</a:t>
             </a:r>
-            <a:endParaRPr lang="en-US" b="1" baseline="30000">
+            <a:endParaRPr lang="en-US" b="1" baseline="30000" dirty="0">
               <a:solidFill>
                 <a:schemeClr val="accent2"/>
               </a:solidFill>
@@ -4652,8 +4662,8 @@
         </p:nvSpPr>
         <p:spPr bwMode="auto">
           <a:xfrm>
-            <a:off x="1600200" y="2743200"/>
-            <a:ext cx="609600" cy="369888"/>
+            <a:off x="1676400" y="2438400"/>
+            <a:ext cx="609600" cy="369332"/>
           </a:xfrm>
           <a:prstGeom prst="rect">
             <a:avLst/>
@@ -4678,7 +4688,7 @@
               </a:spcBef>
             </a:pPr>
             <a:r>
-              <a:rPr lang="en-US" b="1">
+              <a:rPr lang="en-US" b="1" dirty="0">
                 <a:solidFill>
                   <a:schemeClr val="accent2"/>
                 </a:solidFill>
@@ -4686,7 +4696,7 @@
               </a:rPr>
               <a:t>L,Q</a:t>
             </a:r>
-            <a:endParaRPr lang="en-US" b="1" baseline="30000">
+            <a:endParaRPr lang="en-US" b="1" baseline="30000" dirty="0">
               <a:solidFill>
                 <a:schemeClr val="accent2"/>
               </a:solidFill>
@@ -4698,15 +4708,13 @@
       <p:cxnSp>
         <p:nvCxnSpPr>
           <p:cNvPr id="34" name="Straight Arrow Connector 33"/>
-          <p:cNvCxnSpPr>
-            <a:endCxn id="3091" idx="2"/>
-          </p:cNvCxnSpPr>
+          <p:cNvCxnSpPr/>
           <p:nvPr/>
         </p:nvCxnSpPr>
         <p:spPr>
-          <a:xfrm rot="16200000" flipV="1">
-            <a:off x="5351462" y="7561263"/>
-            <a:ext cx="422275" cy="0"/>
+          <a:xfrm flipV="1">
+            <a:off x="5553075" y="7410451"/>
+            <a:ext cx="1" cy="419099"/>
           </a:xfrm>
           <a:prstGeom prst="straightConnector1">
             <a:avLst/>
@@ -4741,7 +4749,7 @@
         </p:nvCxnSpPr>
         <p:spPr>
           <a:xfrm>
-            <a:off x="4343400" y="7010400"/>
+            <a:off x="4343400" y="7010401"/>
             <a:ext cx="304800" cy="1588"/>
           </a:xfrm>
           <a:prstGeom prst="straightConnector1">
@@ -4779,8 +4787,8 @@
         </p:nvSpPr>
         <p:spPr bwMode="auto">
           <a:xfrm>
-            <a:off x="3810000" y="6172200"/>
-            <a:ext cx="560388" cy="369888"/>
+            <a:off x="3886200" y="5715000"/>
+            <a:ext cx="560388" cy="369332"/>
           </a:xfrm>
           <a:prstGeom prst="rect">
             <a:avLst/>
@@ -4805,7 +4813,7 @@
               </a:spcBef>
             </a:pPr>
             <a:r>
-              <a:rPr lang="en-US" b="1">
+              <a:rPr lang="en-US" b="1" dirty="0">
                 <a:solidFill>
                   <a:schemeClr val="accent2"/>
                 </a:solidFill>
@@ -4813,7 +4821,7 @@
               </a:rPr>
               <a:t>Λ,T </a:t>
             </a:r>
-            <a:endParaRPr lang="en-US" b="1" baseline="30000">
+            <a:endParaRPr lang="en-US" b="1" baseline="30000" dirty="0">
               <a:solidFill>
                 <a:schemeClr val="accent2"/>
               </a:solidFill>
@@ -4832,8 +4840,8 @@
         </p:nvSpPr>
         <p:spPr bwMode="auto">
           <a:xfrm>
-            <a:off x="4648200" y="6705600"/>
-            <a:ext cx="1828800" cy="644525"/>
+            <a:off x="4600575" y="6734175"/>
+            <a:ext cx="1920240" cy="731520"/>
           </a:xfrm>
           <a:prstGeom prst="rect">
             <a:avLst/>
@@ -4873,8 +4881,8 @@
         </p:nvSpPr>
         <p:spPr bwMode="auto">
           <a:xfrm>
-            <a:off x="4648200" y="6705600"/>
-            <a:ext cx="1752600" cy="400050"/>
+            <a:off x="4572000" y="6934200"/>
+            <a:ext cx="1981200" cy="523220"/>
           </a:xfrm>
           <a:prstGeom prst="rect">
             <a:avLst/>
@@ -4888,7 +4896,7 @@
           </a:ln>
         </p:spPr>
         <p:txBody>
-          <a:bodyPr>
+          <a:bodyPr wrap="square">
             <a:spAutoFit/>
           </a:bodyPr>
           <a:lstStyle/>
@@ -4899,11 +4907,14 @@
               </a:spcBef>
             </a:pPr>
             <a:r>
-              <a:rPr lang="en-US" sz="2000">
+              <a:rPr lang="en-US" sz="1400" dirty="0" smtClean="0">
                 <a:latin typeface="Calibri" pitchFamily="34" charset="0"/>
               </a:rPr>
-              <a:t>ModelMap</a:t>
-            </a:r>
+              <a:t>Mappings from Model Space to Numerical Grid</a:t>
+            </a:r>
+            <a:endParaRPr lang="en-US" sz="1400" dirty="0">
+              <a:latin typeface="Calibri" pitchFamily="34" charset="0"/>
+            </a:endParaRPr>
           </a:p>
         </p:txBody>
       </p:sp>
@@ -4917,8 +4928,8 @@
         </p:nvSpPr>
         <p:spPr bwMode="auto">
           <a:xfrm>
-            <a:off x="5867400" y="7010400"/>
-            <a:ext cx="609600" cy="369888"/>
+            <a:off x="5943600" y="6705600"/>
+            <a:ext cx="609600" cy="369332"/>
           </a:xfrm>
           <a:prstGeom prst="rect">
             <a:avLst/>
@@ -4943,7 +4954,7 @@
               </a:spcBef>
             </a:pPr>
             <a:r>
-              <a:rPr lang="el-GR" b="1">
+              <a:rPr lang="el-GR" b="1" dirty="0">
                 <a:solidFill>
                   <a:schemeClr val="accent2"/>
                 </a:solidFill>
@@ -4952,7 +4963,7 @@
               <a:t>π</a:t>
             </a:r>
             <a:r>
-              <a:rPr lang="en-US" b="1">
+              <a:rPr lang="en-US" b="1" dirty="0">
                 <a:solidFill>
                   <a:schemeClr val="accent2"/>
                 </a:solidFill>
@@ -4960,7 +4971,7 @@
               </a:rPr>
               <a:t>,Π </a:t>
             </a:r>
-            <a:endParaRPr lang="en-US" b="1" baseline="30000">
+            <a:endParaRPr lang="en-US" b="1" baseline="30000" dirty="0">
               <a:solidFill>
                 <a:schemeClr val="accent2"/>
               </a:solidFill>
@@ -4979,8 +4990,8 @@
         </p:nvSpPr>
         <p:spPr bwMode="auto">
           <a:xfrm>
-            <a:off x="2514600" y="6705600"/>
-            <a:ext cx="1828800" cy="644525"/>
+            <a:off x="2466975" y="6734175"/>
+            <a:ext cx="1920240" cy="731520"/>
           </a:xfrm>
           <a:prstGeom prst="rect">
             <a:avLst/>
@@ -5020,8 +5031,8 @@
         </p:nvSpPr>
         <p:spPr bwMode="auto">
           <a:xfrm>
-            <a:off x="381000" y="6705600"/>
-            <a:ext cx="1828800" cy="644525"/>
+            <a:off x="333375" y="6734175"/>
+            <a:ext cx="1920240" cy="731520"/>
           </a:xfrm>
           <a:prstGeom prst="rect">
             <a:avLst/>
@@ -5061,8 +5072,8 @@
         </p:nvSpPr>
         <p:spPr bwMode="auto">
           <a:xfrm>
-            <a:off x="4648200" y="5867400"/>
-            <a:ext cx="1828800" cy="644525"/>
+            <a:off x="4610100" y="5715000"/>
+            <a:ext cx="1920240" cy="731520"/>
           </a:xfrm>
           <a:prstGeom prst="rect">
             <a:avLst/>
@@ -5102,8 +5113,8 @@
         </p:nvSpPr>
         <p:spPr bwMode="auto">
           <a:xfrm>
-            <a:off x="2514600" y="5867400"/>
-            <a:ext cx="1828800" cy="644525"/>
+            <a:off x="2476500" y="5715000"/>
+            <a:ext cx="1920240" cy="731520"/>
           </a:xfrm>
           <a:prstGeom prst="rect">
             <a:avLst/>
@@ -5136,13 +5147,15 @@
       <p:cxnSp>
         <p:nvCxnSpPr>
           <p:cNvPr id="55" name="Straight Arrow Connector 54"/>
-          <p:cNvCxnSpPr/>
+          <p:cNvCxnSpPr>
+            <a:stCxn id="3107" idx="0"/>
+          </p:cNvCxnSpPr>
           <p:nvPr/>
         </p:nvCxnSpPr>
         <p:spPr>
-          <a:xfrm rot="16200000" flipV="1">
-            <a:off x="5249068" y="5530057"/>
-            <a:ext cx="633413" cy="6350"/>
+          <a:xfrm flipH="1" flipV="1">
+            <a:off x="5581650" y="5248275"/>
+            <a:ext cx="19050" cy="466725"/>
           </a:xfrm>
           <a:prstGeom prst="straightConnector1">
             <a:avLst/>
@@ -5179,8 +5192,8 @@
         </p:nvSpPr>
         <p:spPr bwMode="auto">
           <a:xfrm>
-            <a:off x="2514600" y="4572000"/>
-            <a:ext cx="1828800" cy="644525"/>
+            <a:off x="2466975" y="4600575"/>
+            <a:ext cx="1920240" cy="731520"/>
           </a:xfrm>
           <a:prstGeom prst="rect">
             <a:avLst/>
@@ -5220,8 +5233,8 @@
         </p:nvSpPr>
         <p:spPr bwMode="auto">
           <a:xfrm>
-            <a:off x="381000" y="4572000"/>
-            <a:ext cx="1828800" cy="644525"/>
+            <a:off x="333375" y="4600575"/>
+            <a:ext cx="1920240" cy="731520"/>
           </a:xfrm>
           <a:prstGeom prst="rect">
             <a:avLst/>
@@ -5261,8 +5274,8 @@
         </p:nvSpPr>
         <p:spPr bwMode="auto">
           <a:xfrm>
-            <a:off x="4648200" y="3733800"/>
-            <a:ext cx="1828800" cy="1492250"/>
+            <a:off x="4619625" y="3609975"/>
+            <a:ext cx="1914525" cy="1733550"/>
           </a:xfrm>
           <a:prstGeom prst="rect">
             <a:avLst/>
@@ -5286,6 +5299,12 @@
           <a:bodyPr wrap="none" anchor="ctr"/>
           <a:lstStyle/>
           <a:p>
+            <a:r>
+              <a:rPr lang="en-US" dirty="0" smtClean="0">
+                <a:latin typeface="Calibri" pitchFamily="34" charset="0"/>
+              </a:rPr>
+              <a:t>                               </a:t>
+            </a:r>
             <a:endParaRPr lang="en-US" dirty="0">
               <a:latin typeface="Calibri" pitchFamily="34" charset="0"/>
             </a:endParaRPr>
@@ -5302,8 +5321,8 @@
         </p:nvSpPr>
         <p:spPr bwMode="auto">
           <a:xfrm>
-            <a:off x="2514600" y="3733800"/>
-            <a:ext cx="1828800" cy="644525"/>
+            <a:off x="2466975" y="3609975"/>
+            <a:ext cx="1920240" cy="731520"/>
           </a:xfrm>
           <a:prstGeom prst="rect">
             <a:avLst/>
@@ -5336,15 +5355,13 @@
       <p:cxnSp>
         <p:nvCxnSpPr>
           <p:cNvPr id="66" name="Straight Arrow Connector 65"/>
-          <p:cNvCxnSpPr>
-            <a:endCxn id="3104" idx="2"/>
-          </p:cNvCxnSpPr>
+          <p:cNvCxnSpPr/>
           <p:nvPr/>
         </p:nvCxnSpPr>
         <p:spPr>
-          <a:xfrm rot="5400000" flipH="1" flipV="1">
-            <a:off x="3103563" y="3405187"/>
-            <a:ext cx="647700" cy="3175"/>
+          <a:xfrm flipH="1" flipV="1">
+            <a:off x="3429000" y="3095625"/>
+            <a:ext cx="1" cy="600076"/>
           </a:xfrm>
           <a:prstGeom prst="straightConnector1">
             <a:avLst/>
@@ -5381,8 +5398,8 @@
         </p:nvSpPr>
         <p:spPr bwMode="auto">
           <a:xfrm>
-            <a:off x="2514600" y="2438400"/>
-            <a:ext cx="1828800" cy="644525"/>
+            <a:off x="2466975" y="2466975"/>
+            <a:ext cx="1920240" cy="731520"/>
           </a:xfrm>
           <a:prstGeom prst="rect">
             <a:avLst/>
@@ -5422,8 +5439,8 @@
         </p:nvSpPr>
         <p:spPr bwMode="auto">
           <a:xfrm>
-            <a:off x="381000" y="2438400"/>
-            <a:ext cx="1828800" cy="644525"/>
+            <a:off x="333375" y="2466975"/>
+            <a:ext cx="1920240" cy="731520"/>
           </a:xfrm>
           <a:prstGeom prst="rect">
             <a:avLst/>
@@ -5463,8 +5480,8 @@
         </p:nvSpPr>
         <p:spPr bwMode="auto">
           <a:xfrm>
-            <a:off x="2514600" y="1600200"/>
-            <a:ext cx="1828800" cy="644525"/>
+            <a:off x="2466975" y="1533525"/>
+            <a:ext cx="1920240" cy="731520"/>
           </a:xfrm>
           <a:prstGeom prst="rect">
             <a:avLst/>
@@ -5504,8 +5521,8 @@
         </p:nvSpPr>
         <p:spPr bwMode="auto">
           <a:xfrm>
-            <a:off x="4648200" y="5867400"/>
-            <a:ext cx="1752600" cy="400050"/>
+            <a:off x="4724400" y="5715000"/>
+            <a:ext cx="1752600" cy="584775"/>
           </a:xfrm>
           <a:prstGeom prst="rect">
             <a:avLst/>
@@ -5530,11 +5547,14 @@
               </a:spcBef>
             </a:pPr>
             <a:r>
-              <a:rPr lang="en-US" sz="2000">
+              <a:rPr lang="en-US" sz="1600" b="1" dirty="0" smtClean="0">
                 <a:latin typeface="Calibri" pitchFamily="34" charset="0"/>
               </a:rPr>
-              <a:t>EMsolver</a:t>
-            </a:r>
+              <a:t>Numerical Forward Solver</a:t>
+            </a:r>
+            <a:endParaRPr lang="en-US" sz="1600" b="1" dirty="0">
+              <a:latin typeface="Calibri" pitchFamily="34" charset="0"/>
+            </a:endParaRPr>
           </a:p>
         </p:txBody>
       </p:sp>
@@ -5548,8 +5568,8 @@
         </p:nvSpPr>
         <p:spPr bwMode="auto">
           <a:xfrm>
-            <a:off x="4953000" y="4038600"/>
-            <a:ext cx="1143000" cy="708025"/>
+            <a:off x="5029200" y="3657600"/>
+            <a:ext cx="1143000" cy="830997"/>
           </a:xfrm>
           <a:prstGeom prst="rect">
             <a:avLst/>
@@ -5574,11 +5594,20 @@
               </a:spcBef>
             </a:pPr>
             <a:r>
-              <a:rPr lang="en-US" sz="2000">
+              <a:rPr lang="en-US" sz="1600" b="1" dirty="0">
                 <a:latin typeface="Calibri" pitchFamily="34" charset="0"/>
               </a:rPr>
-              <a:t>Forward Solver</a:t>
-            </a:r>
+              <a:t>Forward </a:t>
+            </a:r>
+            <a:r>
+              <a:rPr lang="en-US" sz="1600" b="1" dirty="0" smtClean="0">
+                <a:latin typeface="Calibri" pitchFamily="34" charset="0"/>
+              </a:rPr>
+              <a:t>Solver (Driver)</a:t>
+            </a:r>
+            <a:endParaRPr lang="en-US" sz="1600" b="1" dirty="0">
+              <a:latin typeface="Calibri" pitchFamily="34" charset="0"/>
+            </a:endParaRPr>
           </a:p>
         </p:txBody>
       </p:sp>
@@ -5592,8 +5621,8 @@
         </p:nvSpPr>
         <p:spPr bwMode="auto">
           <a:xfrm>
-            <a:off x="2514600" y="2438400"/>
-            <a:ext cx="1752600" cy="400050"/>
+            <a:off x="2514600" y="2514600"/>
+            <a:ext cx="1752600" cy="584775"/>
           </a:xfrm>
           <a:prstGeom prst="rect">
             <a:avLst/>
@@ -5618,11 +5647,14 @@
               </a:spcBef>
             </a:pPr>
             <a:r>
-              <a:rPr lang="en-US" sz="2000">
+              <a:rPr lang="en-US" sz="1600" b="1" dirty="0" smtClean="0">
                 <a:latin typeface="Calibri" pitchFamily="34" charset="0"/>
               </a:rPr>
-              <a:t>SensComp</a:t>
-            </a:r>
+              <a:t>Jacobian Computations</a:t>
+            </a:r>
+            <a:endParaRPr lang="en-US" sz="1600" b="1" dirty="0">
+              <a:latin typeface="Calibri" pitchFamily="34" charset="0"/>
+            </a:endParaRPr>
           </a:p>
         </p:txBody>
       </p:sp>
@@ -5636,8 +5668,8 @@
         </p:nvSpPr>
         <p:spPr bwMode="auto">
           <a:xfrm>
-            <a:off x="2514600" y="1600200"/>
-            <a:ext cx="1752600" cy="400050"/>
+            <a:off x="2400300" y="1600200"/>
+            <a:ext cx="2057400" cy="584775"/>
           </a:xfrm>
           <a:prstGeom prst="rect">
             <a:avLst/>
@@ -5651,7 +5683,7 @@
           </a:ln>
         </p:spPr>
         <p:txBody>
-          <a:bodyPr>
+          <a:bodyPr wrap="square">
             <a:spAutoFit/>
           </a:bodyPr>
           <a:lstStyle/>
@@ -5662,11 +5694,20 @@
               </a:spcBef>
             </a:pPr>
             <a:r>
-              <a:rPr lang="en-US" sz="2000">
+              <a:rPr lang="en-US" sz="1600" b="1" dirty="0" smtClean="0">
                 <a:latin typeface="Calibri" pitchFamily="34" charset="0"/>
               </a:rPr>
-              <a:t>NLCG etc</a:t>
-            </a:r>
+              <a:t>Inversion Algorithms </a:t>
+            </a:r>
+            <a:r>
+              <a:rPr lang="en-US" sz="1600" dirty="0" smtClean="0">
+                <a:latin typeface="Calibri" pitchFamily="34" charset="0"/>
+              </a:rPr>
+              <a:t>(NLCG, DCG etc)</a:t>
+            </a:r>
+            <a:endParaRPr lang="en-US" sz="1600" dirty="0">
+              <a:latin typeface="Calibri" pitchFamily="34" charset="0"/>
+            </a:endParaRPr>
           </a:p>
         </p:txBody>
       </p:sp>
@@ -5680,8 +5721,8 @@
         </p:nvSpPr>
         <p:spPr bwMode="auto">
           <a:xfrm>
-            <a:off x="381000" y="6705600"/>
-            <a:ext cx="1752600" cy="400050"/>
+            <a:off x="381000" y="6858000"/>
+            <a:ext cx="1752600" cy="338554"/>
           </a:xfrm>
           <a:prstGeom prst="rect">
             <a:avLst/>
@@ -5706,11 +5747,14 @@
               </a:spcBef>
             </a:pPr>
             <a:r>
-              <a:rPr lang="en-US" sz="2000">
+              <a:rPr lang="en-US" sz="1600" b="1" dirty="0" smtClean="0">
                 <a:latin typeface="Calibri" pitchFamily="34" charset="0"/>
               </a:rPr>
-              <a:t>Grid</a:t>
-            </a:r>
+              <a:t>Numerical Grid</a:t>
+            </a:r>
+            <a:endParaRPr lang="en-US" sz="1600" b="1" dirty="0">
+              <a:latin typeface="Calibri" pitchFamily="34" charset="0"/>
+            </a:endParaRPr>
           </a:p>
         </p:txBody>
       </p:sp>
@@ -5724,8 +5768,8 @@
         </p:nvSpPr>
         <p:spPr bwMode="auto">
           <a:xfrm>
-            <a:off x="2514600" y="5867400"/>
-            <a:ext cx="1752600" cy="400050"/>
+            <a:off x="2543175" y="5924550"/>
+            <a:ext cx="1752600" cy="523220"/>
           </a:xfrm>
           <a:prstGeom prst="rect">
             <a:avLst/>
@@ -5750,11 +5794,26 @@
               </a:spcBef>
             </a:pPr>
             <a:r>
-              <a:rPr lang="en-US" sz="2000">
+              <a:rPr lang="en-US" sz="1400" dirty="0" smtClean="0">
                 <a:latin typeface="Calibri" pitchFamily="34" charset="0"/>
               </a:rPr>
-              <a:t>EMfield Interp</a:t>
-            </a:r>
+              <a:t>Interpolation on the </a:t>
+            </a:r>
+            <a:r>
+              <a:rPr lang="en-US" sz="1400" dirty="0" smtClean="0">
+                <a:latin typeface="Calibri" pitchFamily="34" charset="0"/>
+              </a:rPr>
+              <a:t>N</a:t>
+            </a:r>
+            <a:r>
+              <a:rPr lang="en-US" sz="1400" dirty="0" smtClean="0">
+                <a:latin typeface="Calibri" pitchFamily="34" charset="0"/>
+              </a:rPr>
+              <a:t>umerical Grid</a:t>
+            </a:r>
+            <a:endParaRPr lang="en-US" sz="1400" dirty="0">
+              <a:latin typeface="Calibri" pitchFamily="34" charset="0"/>
+            </a:endParaRPr>
           </a:p>
         </p:txBody>
       </p:sp>
@@ -5768,8 +5827,8 @@
         </p:nvSpPr>
         <p:spPr bwMode="auto">
           <a:xfrm>
-            <a:off x="2514600" y="4572000"/>
-            <a:ext cx="1752600" cy="400050"/>
+            <a:off x="2895600" y="4648200"/>
+            <a:ext cx="990600" cy="584775"/>
           </a:xfrm>
           <a:prstGeom prst="rect">
             <a:avLst/>
@@ -5783,7 +5842,7 @@
           </a:ln>
         </p:spPr>
         <p:txBody>
-          <a:bodyPr>
+          <a:bodyPr wrap="square">
             <a:spAutoFit/>
           </a:bodyPr>
           <a:lstStyle/>
@@ -5794,11 +5853,14 @@
               </a:spcBef>
             </a:pPr>
             <a:r>
-              <a:rPr lang="en-US" sz="2000">
+              <a:rPr lang="en-US" sz="1600" b="1" dirty="0" smtClean="0">
                 <a:latin typeface="Calibri" pitchFamily="34" charset="0"/>
               </a:rPr>
-              <a:t>SolnSpace</a:t>
-            </a:r>
+              <a:t>Solution Space</a:t>
+            </a:r>
+            <a:endParaRPr lang="en-US" sz="1600" b="1" dirty="0">
+              <a:latin typeface="Calibri" pitchFamily="34" charset="0"/>
+            </a:endParaRPr>
           </a:p>
         </p:txBody>
       </p:sp>
@@ -5812,8 +5874,8 @@
         </p:nvSpPr>
         <p:spPr bwMode="auto">
           <a:xfrm>
-            <a:off x="2514600" y="3733800"/>
-            <a:ext cx="1752600" cy="400050"/>
+            <a:off x="2971800" y="3657600"/>
+            <a:ext cx="1447800" cy="584775"/>
           </a:xfrm>
           <a:prstGeom prst="rect">
             <a:avLst/>
@@ -5827,7 +5889,7 @@
           </a:ln>
         </p:spPr>
         <p:txBody>
-          <a:bodyPr>
+          <a:bodyPr wrap="square">
             <a:spAutoFit/>
           </a:bodyPr>
           <a:lstStyle/>
@@ -5838,12 +5900,12 @@
               </a:spcBef>
             </a:pPr>
             <a:r>
-              <a:rPr lang="en-US" sz="2000" dirty="0" smtClean="0">
+              <a:rPr lang="en-US" sz="1600" b="1" dirty="0" smtClean="0">
                 <a:latin typeface="Calibri" pitchFamily="34" charset="0"/>
               </a:rPr>
-              <a:t>SolverSens</a:t>
-            </a:r>
-            <a:endParaRPr lang="en-US" sz="2000" dirty="0">
+              <a:t>Solver Sensitivities</a:t>
+            </a:r>
+            <a:endParaRPr lang="en-US" sz="1600" b="1" dirty="0">
               <a:latin typeface="Calibri" pitchFamily="34" charset="0"/>
             </a:endParaRPr>
           </a:p>
@@ -5859,8 +5921,8 @@
         </p:nvSpPr>
         <p:spPr bwMode="auto">
           <a:xfrm>
-            <a:off x="2514600" y="6705600"/>
-            <a:ext cx="1752600" cy="400050"/>
+            <a:off x="2514600" y="6858000"/>
+            <a:ext cx="1752600" cy="338554"/>
           </a:xfrm>
           <a:prstGeom prst="rect">
             <a:avLst/>
@@ -5885,11 +5947,14 @@
               </a:spcBef>
             </a:pPr>
             <a:r>
-              <a:rPr lang="en-US" sz="2000">
+              <a:rPr lang="en-US" sz="1600" b="1" dirty="0" smtClean="0">
                 <a:latin typeface="Calibri" pitchFamily="34" charset="0"/>
               </a:rPr>
-              <a:t>EMfield</a:t>
-            </a:r>
+              <a:t>EM fields</a:t>
+            </a:r>
+            <a:endParaRPr lang="en-US" sz="1600" b="1" dirty="0">
+              <a:latin typeface="Calibri" pitchFamily="34" charset="0"/>
+            </a:endParaRPr>
           </a:p>
         </p:txBody>
       </p:sp>
@@ -5903,8 +5968,8 @@
         </p:nvSpPr>
         <p:spPr bwMode="auto">
           <a:xfrm>
-            <a:off x="381000" y="4572000"/>
-            <a:ext cx="1752600" cy="400050"/>
+            <a:off x="381000" y="4953000"/>
+            <a:ext cx="1752600" cy="338554"/>
           </a:xfrm>
           <a:prstGeom prst="rect">
             <a:avLst/>
@@ -5918,7 +5983,7 @@
           </a:ln>
         </p:spPr>
         <p:txBody>
-          <a:bodyPr>
+          <a:bodyPr wrap="square">
             <a:spAutoFit/>
           </a:bodyPr>
           <a:lstStyle/>
@@ -5929,11 +5994,14 @@
               </a:spcBef>
             </a:pPr>
             <a:r>
-              <a:rPr lang="en-US" sz="2000" dirty="0">
+              <a:rPr lang="en-US" sz="1600" b="1" dirty="0" smtClean="0">
                 <a:latin typeface="Calibri" pitchFamily="34" charset="0"/>
               </a:rPr>
-              <a:t>DataFunc</a:t>
-            </a:r>
+              <a:t>Data Functionals</a:t>
+            </a:r>
+            <a:endParaRPr lang="en-US" sz="1600" b="1" dirty="0">
+              <a:latin typeface="Calibri" pitchFamily="34" charset="0"/>
+            </a:endParaRPr>
           </a:p>
         </p:txBody>
       </p:sp>
@@ -5947,8 +6015,8 @@
         </p:nvSpPr>
         <p:spPr bwMode="auto">
           <a:xfrm>
-            <a:off x="381000" y="2438400"/>
-            <a:ext cx="1752600" cy="400050"/>
+            <a:off x="457200" y="2514600"/>
+            <a:ext cx="1600200" cy="584775"/>
           </a:xfrm>
           <a:prstGeom prst="rect">
             <a:avLst/>
@@ -5962,7 +6030,7 @@
           </a:ln>
         </p:spPr>
         <p:txBody>
-          <a:bodyPr>
+          <a:bodyPr wrap="square">
             <a:spAutoFit/>
           </a:bodyPr>
           <a:lstStyle/>
@@ -5973,11 +6041,14 @@
               </a:spcBef>
             </a:pPr>
             <a:r>
-              <a:rPr lang="en-US" sz="2000">
+              <a:rPr lang="en-US" sz="1600" b="1" dirty="0" smtClean="0">
                 <a:latin typeface="Calibri" pitchFamily="34" charset="0"/>
               </a:rPr>
-              <a:t>DataSens</a:t>
-            </a:r>
+              <a:t>Data Sensitivities</a:t>
+            </a:r>
+            <a:endParaRPr lang="en-US" sz="1600" b="1" dirty="0">
+              <a:latin typeface="Calibri" pitchFamily="34" charset="0"/>
+            </a:endParaRPr>
           </a:p>
         </p:txBody>
       </p:sp>
@@ -5988,9 +6059,9 @@
           <p:nvPr/>
         </p:nvCxnSpPr>
         <p:spPr>
-          <a:xfrm rot="10800000">
-            <a:off x="4343400" y="6526213"/>
-            <a:ext cx="304800" cy="179387"/>
+          <a:xfrm flipH="1" flipV="1">
+            <a:off x="4343400" y="6400801"/>
+            <a:ext cx="304800" cy="380999"/>
           </a:xfrm>
           <a:prstGeom prst="straightConnector1">
             <a:avLst/>
@@ -6024,9 +6095,9 @@
           <p:nvPr/>
         </p:nvCxnSpPr>
         <p:spPr>
-          <a:xfrm>
+          <a:xfrm flipV="1">
             <a:off x="4343400" y="6172200"/>
-            <a:ext cx="304800" cy="1588"/>
+            <a:ext cx="314325" cy="1"/>
           </a:xfrm>
           <a:prstGeom prst="straightConnector1">
             <a:avLst/>
@@ -6063,8 +6134,8 @@
         </p:nvSpPr>
         <p:spPr bwMode="auto">
           <a:xfrm>
-            <a:off x="3810000" y="4876800"/>
-            <a:ext cx="482600" cy="369888"/>
+            <a:off x="3886200" y="4572000"/>
+            <a:ext cx="482600" cy="369332"/>
           </a:xfrm>
           <a:prstGeom prst="rect">
             <a:avLst/>
@@ -6089,7 +6160,7 @@
               </a:spcBef>
             </a:pPr>
             <a:r>
-              <a:rPr lang="en-US" b="1">
+              <a:rPr lang="en-US" b="1" dirty="0" err="1">
                 <a:solidFill>
                   <a:schemeClr val="accent2"/>
                 </a:solidFill>
@@ -6097,7 +6168,7 @@
               </a:rPr>
               <a:t>e,b</a:t>
             </a:r>
-            <a:endParaRPr lang="en-US" b="1" baseline="30000">
+            <a:endParaRPr lang="en-US" b="1" baseline="30000" dirty="0">
               <a:solidFill>
                 <a:schemeClr val="accent2"/>
               </a:solidFill>
@@ -6116,8 +6187,8 @@
         </p:nvSpPr>
         <p:spPr bwMode="auto">
           <a:xfrm>
-            <a:off x="6019800" y="4876800"/>
-            <a:ext cx="419100" cy="369888"/>
+            <a:off x="6096000" y="3657600"/>
+            <a:ext cx="419100" cy="369332"/>
           </a:xfrm>
           <a:prstGeom prst="rect">
             <a:avLst/>
@@ -6142,7 +6213,7 @@
               </a:spcBef>
             </a:pPr>
             <a:r>
-              <a:rPr lang="en-US" b="1">
+              <a:rPr lang="en-US" b="1" dirty="0">
                 <a:solidFill>
                   <a:schemeClr val="accent2"/>
                 </a:solidFill>
@@ -6151,7 +6222,7 @@
               <a:t>S</a:t>
             </a:r>
             <a:r>
-              <a:rPr lang="en-US" b="1" baseline="30000">
+              <a:rPr lang="en-US" b="1" baseline="30000" dirty="0">
                 <a:solidFill>
                   <a:schemeClr val="accent2"/>
                 </a:solidFill>
@@ -6172,8 +6243,8 @@
         </p:nvSpPr>
         <p:spPr bwMode="auto">
           <a:xfrm>
-            <a:off x="3962400" y="4038600"/>
-            <a:ext cx="307975" cy="369888"/>
+            <a:off x="4038600" y="3581400"/>
+            <a:ext cx="307975" cy="369332"/>
           </a:xfrm>
           <a:prstGeom prst="rect">
             <a:avLst/>
@@ -6198,7 +6269,7 @@
               </a:spcBef>
             </a:pPr>
             <a:r>
-              <a:rPr lang="en-US" b="1">
+              <a:rPr lang="en-US" b="1" dirty="0">
                 <a:solidFill>
                   <a:schemeClr val="accent2"/>
                 </a:solidFill>
@@ -6206,7 +6277,7 @@
               </a:rPr>
               <a:t>P</a:t>
             </a:r>
-            <a:endParaRPr lang="en-US" b="1" baseline="30000">
+            <a:endParaRPr lang="en-US" b="1" baseline="30000" dirty="0">
               <a:solidFill>
                 <a:schemeClr val="accent2"/>
               </a:solidFill>
@@ -6222,9 +6293,9 @@
           <p:nvPr/>
         </p:nvCxnSpPr>
         <p:spPr>
-          <a:xfrm rot="5400000" flipH="1" flipV="1">
-            <a:off x="3318669" y="4448969"/>
-            <a:ext cx="217488" cy="6350"/>
+          <a:xfrm flipV="1">
+            <a:off x="3429000" y="4229101"/>
+            <a:ext cx="0" cy="428624"/>
           </a:xfrm>
           <a:prstGeom prst="straightConnector1">
             <a:avLst/>
@@ -6258,9 +6329,9 @@
           <p:nvPr/>
         </p:nvCxnSpPr>
         <p:spPr>
-          <a:xfrm rot="16200000" flipV="1">
-            <a:off x="2022475" y="5392738"/>
-            <a:ext cx="684213" cy="331787"/>
+          <a:xfrm flipH="1" flipV="1">
+            <a:off x="2209800" y="5257800"/>
+            <a:ext cx="314326" cy="523876"/>
           </a:xfrm>
           <a:prstGeom prst="straightConnector1">
             <a:avLst/>
@@ -6295,7 +6366,7 @@
         </p:nvSpPr>
         <p:spPr>
           <a:xfrm>
-            <a:off x="762000" y="4953000"/>
+            <a:off x="762000" y="4648200"/>
             <a:ext cx="381000" cy="293688"/>
           </a:xfrm>
           <a:prstGeom prst="roundRect">
@@ -6358,7 +6429,7 @@
         </p:nvSpPr>
         <p:spPr>
           <a:xfrm>
-            <a:off x="1143000" y="4953000"/>
+            <a:off x="1143000" y="4648200"/>
             <a:ext cx="381000" cy="293688"/>
           </a:xfrm>
           <a:prstGeom prst="roundRect">
@@ -6421,7 +6492,7 @@
         </p:nvSpPr>
         <p:spPr>
           <a:xfrm>
-            <a:off x="4648200" y="4953000"/>
+            <a:off x="4648200" y="3657600"/>
             <a:ext cx="381000" cy="293688"/>
           </a:xfrm>
           <a:prstGeom prst="roundRect">
@@ -6484,7 +6555,7 @@
         </p:nvSpPr>
         <p:spPr>
           <a:xfrm>
-            <a:off x="2895600" y="4114800"/>
+            <a:off x="2895600" y="3657600"/>
             <a:ext cx="381000" cy="293688"/>
           </a:xfrm>
           <a:prstGeom prst="roundRect">
@@ -6547,7 +6618,7 @@
         </p:nvSpPr>
         <p:spPr>
           <a:xfrm>
-            <a:off x="2514600" y="4953000"/>
+            <a:off x="2514600" y="4648200"/>
             <a:ext cx="381000" cy="293688"/>
           </a:xfrm>
           <a:prstGeom prst="roundRect">
@@ -6609,9 +6680,9 @@
           <p:nvPr/>
         </p:nvCxnSpPr>
         <p:spPr>
-          <a:xfrm rot="16200000" flipV="1">
-            <a:off x="3089275" y="5538788"/>
-            <a:ext cx="633413" cy="7937"/>
+          <a:xfrm flipH="1" flipV="1">
+            <a:off x="3419475" y="5219700"/>
+            <a:ext cx="1" cy="581026"/>
           </a:xfrm>
           <a:prstGeom prst="straightConnector1">
             <a:avLst/>
@@ -6645,9 +6716,9 @@
           <p:nvPr/>
         </p:nvCxnSpPr>
         <p:spPr>
-          <a:xfrm rot="10800000">
-            <a:off x="2209800" y="4876800"/>
-            <a:ext cx="320675" cy="0"/>
+          <a:xfrm flipH="1">
+            <a:off x="2171703" y="4886325"/>
+            <a:ext cx="314322" cy="0"/>
           </a:xfrm>
           <a:prstGeom prst="straightConnector1">
             <a:avLst/>
@@ -6682,8 +6753,8 @@
         </p:nvCxnSpPr>
         <p:spPr>
           <a:xfrm>
-            <a:off x="4343400" y="4876800"/>
-            <a:ext cx="304800" cy="1588"/>
+            <a:off x="4343400" y="4905375"/>
+            <a:ext cx="333375" cy="0"/>
           </a:xfrm>
           <a:prstGeom prst="straightConnector1">
             <a:avLst/>
@@ -6717,9 +6788,9 @@
           <p:nvPr/>
         </p:nvCxnSpPr>
         <p:spPr>
-          <a:xfrm rot="5400000" flipH="1" flipV="1">
-            <a:off x="473869" y="3828257"/>
-            <a:ext cx="1489075" cy="1587"/>
+          <a:xfrm flipV="1">
+            <a:off x="1276350" y="3114676"/>
+            <a:ext cx="0" cy="1552574"/>
           </a:xfrm>
           <a:prstGeom prst="straightConnector1">
             <a:avLst/>
@@ -6754,7 +6825,7 @@
         </p:nvSpPr>
         <p:spPr>
           <a:xfrm>
-            <a:off x="381000" y="4953000"/>
+            <a:off x="381000" y="4648200"/>
             <a:ext cx="381000" cy="293688"/>
           </a:xfrm>
           <a:prstGeom prst="roundRect">
@@ -6817,7 +6888,7 @@
         </p:nvSpPr>
         <p:spPr>
           <a:xfrm>
-            <a:off x="2514600" y="4114800"/>
+            <a:off x="2514600" y="3657600"/>
             <a:ext cx="381000" cy="293688"/>
           </a:xfrm>
           <a:prstGeom prst="roundRect">
@@ -6883,7 +6954,7 @@
         <p:spPr bwMode="auto">
           <a:xfrm>
             <a:off x="304800" y="1524000"/>
-            <a:ext cx="990600" cy="400050"/>
+            <a:ext cx="990600" cy="584775"/>
           </a:xfrm>
           <a:prstGeom prst="rect">
             <a:avLst/>
@@ -6908,14 +6979,20 @@
               </a:spcBef>
             </a:pPr>
             <a:r>
-              <a:rPr lang="en-US" sz="2000" b="1">
+              <a:rPr lang="en-US" sz="1600" b="1" i="1" dirty="0" smtClean="0">
                 <a:solidFill>
                   <a:schemeClr val="accent2"/>
                 </a:solidFill>
                 <a:latin typeface="Calibri" pitchFamily="34" charset="0"/>
               </a:rPr>
-              <a:t>Level I</a:t>
-            </a:r>
+              <a:t>Generic Inversion</a:t>
+            </a:r>
+            <a:endParaRPr lang="en-US" sz="1600" b="1" i="1" dirty="0">
+              <a:solidFill>
+                <a:schemeClr val="accent2"/>
+              </a:solidFill>
+              <a:latin typeface="Calibri" pitchFamily="34" charset="0"/>
+            </a:endParaRPr>
           </a:p>
         </p:txBody>
       </p:sp>
@@ -6930,7 +7007,7 @@
         <p:spPr bwMode="auto">
           <a:xfrm>
             <a:off x="304800" y="3581400"/>
-            <a:ext cx="1066800" cy="400050"/>
+            <a:ext cx="1066800" cy="584775"/>
           </a:xfrm>
           <a:prstGeom prst="rect">
             <a:avLst/>
@@ -6955,14 +7032,20 @@
               </a:spcBef>
             </a:pPr>
             <a:r>
-              <a:rPr lang="en-US" sz="2000" b="1">
+              <a:rPr lang="en-US" sz="1600" b="1" i="1" dirty="0" smtClean="0">
                 <a:solidFill>
                   <a:schemeClr val="accent2"/>
                 </a:solidFill>
                 <a:latin typeface="Calibri" pitchFamily="34" charset="0"/>
               </a:rPr>
-              <a:t>Level II</a:t>
-            </a:r>
+              <a:t>Interface Layer</a:t>
+            </a:r>
+            <a:endParaRPr lang="en-US" sz="1600" b="1" i="1" dirty="0">
+              <a:solidFill>
+                <a:schemeClr val="accent2"/>
+              </a:solidFill>
+              <a:latin typeface="Calibri" pitchFamily="34" charset="0"/>
+            </a:endParaRPr>
           </a:p>
         </p:txBody>
       </p:sp>
@@ -6977,7 +7060,7 @@
         <p:spPr bwMode="auto">
           <a:xfrm>
             <a:off x="304800" y="5715000"/>
-            <a:ext cx="990600" cy="400050"/>
+            <a:ext cx="1447800" cy="584775"/>
           </a:xfrm>
           <a:prstGeom prst="rect">
             <a:avLst/>
@@ -6991,7 +7074,7 @@
           </a:ln>
         </p:spPr>
         <p:txBody>
-          <a:bodyPr>
+          <a:bodyPr wrap="square">
             <a:spAutoFit/>
           </a:bodyPr>
           <a:lstStyle/>
@@ -7002,14 +7085,20 @@
               </a:spcBef>
             </a:pPr>
             <a:r>
-              <a:rPr lang="en-US" sz="2000" b="1">
+              <a:rPr lang="en-US" sz="1600" b="1" i="1" dirty="0" smtClean="0">
                 <a:solidFill>
                   <a:schemeClr val="accent2"/>
                 </a:solidFill>
                 <a:latin typeface="Calibri" pitchFamily="34" charset="0"/>
               </a:rPr>
-              <a:t>Level III</a:t>
-            </a:r>
+              <a:t>Numerical Discretization</a:t>
+            </a:r>
+            <a:endParaRPr lang="en-US" sz="1600" b="1" i="1" dirty="0">
+              <a:solidFill>
+                <a:schemeClr val="accent2"/>
+              </a:solidFill>
+              <a:latin typeface="Calibri" pitchFamily="34" charset="0"/>
+            </a:endParaRPr>
           </a:p>
         </p:txBody>
       </p:sp>
@@ -7020,9 +7109,9 @@
           <p:nvPr/>
         </p:nvCxnSpPr>
         <p:spPr>
-          <a:xfrm rot="16200000" flipV="1">
-            <a:off x="4171950" y="3257550"/>
-            <a:ext cx="647700" cy="304800"/>
+          <a:xfrm flipH="1" flipV="1">
+            <a:off x="4314826" y="3095626"/>
+            <a:ext cx="409574" cy="638174"/>
           </a:xfrm>
           <a:prstGeom prst="straightConnector1">
             <a:avLst/>
@@ -7059,8 +7148,8 @@
         </p:nvSpPr>
         <p:spPr bwMode="auto">
           <a:xfrm>
-            <a:off x="1600200" y="4876800"/>
-            <a:ext cx="558800" cy="369888"/>
+            <a:off x="1552575" y="4572000"/>
+            <a:ext cx="711200" cy="369332"/>
           </a:xfrm>
           <a:prstGeom prst="rect">
             <a:avLst/>
@@ -7074,7 +7163,7 @@
           </a:ln>
         </p:spPr>
         <p:txBody>
-          <a:bodyPr>
+          <a:bodyPr wrap="square">
             <a:spAutoFit/>
           </a:bodyPr>
           <a:lstStyle/>
@@ -7100,7 +7189,43 @@
                 </a:solidFill>
                 <a:latin typeface="Calibri" pitchFamily="34" charset="0"/>
               </a:rPr>
-              <a:t>,A</a:t>
+              <a:t>,</a:t>
+            </a:r>
+            <a:r>
+              <a:rPr lang="en-US" b="1" dirty="0" err="1" smtClean="0">
+                <a:solidFill>
+                  <a:schemeClr val="accent2"/>
+                </a:solidFill>
+                <a:latin typeface="Calibri" pitchFamily="34" charset="0"/>
+              </a:rPr>
+              <a:t>l</a:t>
+            </a:r>
+            <a:r>
+              <a:rPr lang="en-US" b="1" baseline="-25000" dirty="0" err="1" smtClean="0">
+                <a:solidFill>
+                  <a:schemeClr val="accent2"/>
+                </a:solidFill>
+                <a:latin typeface="Calibri" pitchFamily="34" charset="0"/>
+              </a:rPr>
+              <a:t>j</a:t>
+            </a:r>
+            <a:r>
+              <a:rPr lang="en-US" b="1" dirty="0" err="1" smtClean="0">
+                <a:solidFill>
+                  <a:schemeClr val="accent2"/>
+                </a:solidFill>
+                <a:latin typeface="Calibri" pitchFamily="34" charset="0"/>
+              </a:rPr>
+              <a:t>,q</a:t>
+            </a:r>
+            <a:r>
+              <a:rPr lang="en-US" b="1" baseline="-25000" dirty="0" err="1" smtClean="0">
+                <a:solidFill>
+                  <a:schemeClr val="accent2"/>
+                </a:solidFill>
+                <a:latin typeface="Calibri" pitchFamily="34" charset="0"/>
+              </a:rPr>
+              <a:t>j</a:t>
             </a:r>
             <a:endParaRPr lang="en-US" b="1" baseline="30000" dirty="0">
               <a:solidFill>
@@ -7119,7 +7244,7 @@
         </p:nvCxnSpPr>
         <p:spPr>
           <a:xfrm>
-            <a:off x="2209800" y="7010400"/>
+            <a:off x="2209800" y="7010401"/>
             <a:ext cx="304800" cy="1588"/>
           </a:xfrm>
           <a:prstGeom prst="straightConnector1">
@@ -7154,9 +7279,9 @@
           <p:nvPr/>
         </p:nvCxnSpPr>
         <p:spPr>
-          <a:xfrm rot="5400000" flipH="1" flipV="1">
-            <a:off x="3282156" y="6593682"/>
-            <a:ext cx="217487" cy="6350"/>
+          <a:xfrm flipV="1">
+            <a:off x="3390900" y="6429375"/>
+            <a:ext cx="3" cy="342900"/>
           </a:xfrm>
           <a:prstGeom prst="straightConnector1">
             <a:avLst/>
@@ -7191,8 +7316,8 @@
         </p:nvSpPr>
         <p:spPr>
           <a:xfrm>
-            <a:off x="4953000" y="2590800"/>
-            <a:ext cx="762000" cy="277812"/>
+            <a:off x="4953000" y="2667000"/>
+            <a:ext cx="762000" cy="276999"/>
           </a:xfrm>
           <a:prstGeom prst="rect">
             <a:avLst/>
@@ -7241,8 +7366,8 @@
         </p:nvSpPr>
         <p:spPr bwMode="auto">
           <a:xfrm>
-            <a:off x="5715000" y="1828800"/>
-            <a:ext cx="762000" cy="707886"/>
+            <a:off x="5715000" y="2133600"/>
+            <a:ext cx="762000" cy="400110"/>
           </a:xfrm>
           <a:prstGeom prst="rect">
             <a:avLst/>
@@ -7267,7 +7392,7 @@
               </a:spcBef>
             </a:pPr>
             <a:r>
-              <a:rPr lang="en-US" sz="2000" dirty="0">
+              <a:rPr lang="en-US" sz="2000" b="1" dirty="0" smtClean="0">
                 <a:solidFill>
                   <a:schemeClr val="tx1">
                     <a:lumMod val="50000"/>
@@ -7276,8 +7401,17 @@
                 </a:solidFill>
                 <a:latin typeface="Calibri" pitchFamily="34" charset="0"/>
               </a:rPr>
-              <a:t>MPI Main</a:t>
-            </a:r>
+              <a:t>MPI</a:t>
+            </a:r>
+            <a:endParaRPr lang="en-US" sz="2000" b="1" dirty="0">
+              <a:solidFill>
+                <a:schemeClr val="tx1">
+                  <a:lumMod val="50000"/>
+                  <a:lumOff val="50000"/>
+                </a:schemeClr>
+              </a:solidFill>
+              <a:latin typeface="Calibri" pitchFamily="34" charset="0"/>
+            </a:endParaRPr>
           </a:p>
         </p:txBody>
       </p:sp>
@@ -7289,8 +7423,8 @@
         </p:nvSpPr>
         <p:spPr>
           <a:xfrm>
-            <a:off x="4953000" y="1828800"/>
-            <a:ext cx="762000" cy="277813"/>
+            <a:off x="4953000" y="1828801"/>
+            <a:ext cx="762000" cy="276999"/>
           </a:xfrm>
           <a:prstGeom prst="rect">
             <a:avLst/>
@@ -7338,9 +7472,9 @@
           <p:nvPr/>
         </p:nvCxnSpPr>
         <p:spPr>
-          <a:xfrm rot="10800000" flipV="1">
-            <a:off x="4324350" y="1967707"/>
-            <a:ext cx="628650" cy="3968"/>
+          <a:xfrm flipH="1">
+            <a:off x="4238625" y="1967301"/>
+            <a:ext cx="714375" cy="4374"/>
           </a:xfrm>
           <a:prstGeom prst="straightConnector1">
             <a:avLst/>
@@ -7377,9 +7511,9 @@
           <p:nvPr/>
         </p:nvCxnSpPr>
         <p:spPr>
-          <a:xfrm rot="5400000" flipH="1" flipV="1">
-            <a:off x="5158583" y="2339182"/>
-            <a:ext cx="484187" cy="1588"/>
+          <a:xfrm flipH="1" flipV="1">
+            <a:off x="5401472" y="2097885"/>
+            <a:ext cx="8728" cy="540540"/>
           </a:xfrm>
           <a:prstGeom prst="straightConnector1">
             <a:avLst/>
@@ -7415,9 +7549,9 @@
           <p:nvPr/>
         </p:nvCxnSpPr>
         <p:spPr>
-          <a:xfrm rot="16200000" flipV="1">
-            <a:off x="5024442" y="2338388"/>
-            <a:ext cx="476249" cy="9526"/>
+          <a:xfrm flipV="1">
+            <a:off x="5257803" y="2105028"/>
+            <a:ext cx="2" cy="542922"/>
           </a:xfrm>
           <a:prstGeom prst="straightConnector1">
             <a:avLst/>
@@ -7451,14 +7585,14 @@
         <p:nvCxnSpPr>
           <p:cNvPr id="100" name="Straight Arrow Connector 69"/>
           <p:cNvCxnSpPr>
-            <a:endCxn id="3104" idx="3"/>
+            <a:stCxn id="82" idx="1"/>
           </p:cNvCxnSpPr>
           <p:nvPr/>
         </p:nvCxnSpPr>
         <p:spPr>
-          <a:xfrm rot="10800000">
-            <a:off x="4343401" y="2760664"/>
-            <a:ext cx="600075" cy="1587"/>
+          <a:xfrm flipH="1" flipV="1">
+            <a:off x="4276725" y="2800350"/>
+            <a:ext cx="676275" cy="5150"/>
           </a:xfrm>
           <a:prstGeom prst="straightConnector1">
             <a:avLst/>
@@ -7495,9 +7629,9 @@
           <p:nvPr/>
         </p:nvCxnSpPr>
         <p:spPr>
-          <a:xfrm rot="5400000" flipH="1" flipV="1">
-            <a:off x="3323432" y="2315368"/>
-            <a:ext cx="217487" cy="6350"/>
+          <a:xfrm flipH="1" flipV="1">
+            <a:off x="3409955" y="2133601"/>
+            <a:ext cx="9520" cy="409574"/>
           </a:xfrm>
           <a:prstGeom prst="straightConnector1">
             <a:avLst/>
@@ -7593,7 +7727,7 @@
         </p:nvSpPr>
         <p:spPr>
           <a:xfrm>
-            <a:off x="3124200" y="4876800"/>
+            <a:off x="3733800" y="4953000"/>
             <a:ext cx="685800" cy="338554"/>
           </a:xfrm>
           <a:prstGeom prst="rect">
@@ -7717,8 +7851,8 @@
         </p:nvSpPr>
         <p:spPr bwMode="auto">
           <a:xfrm>
-            <a:off x="4648200" y="1600200"/>
-            <a:ext cx="1828800" cy="1492250"/>
+            <a:off x="4619625" y="1524000"/>
+            <a:ext cx="1914525" cy="1676400"/>
           </a:xfrm>
           <a:prstGeom prst="rect">
             <a:avLst/>
@@ -7743,6 +7877,209 @@
           <a:lstStyle/>
           <a:p>
             <a:endParaRPr lang="en-US" dirty="0">
+              <a:latin typeface="Calibri" pitchFamily="34" charset="0"/>
+            </a:endParaRPr>
+          </a:p>
+        </p:txBody>
+      </p:sp>
+      <p:sp>
+        <p:nvSpPr>
+          <p:cNvPr id="89" name="Text Box 28"/>
+          <p:cNvSpPr txBox="1">
+            <a:spLocks noChangeArrowheads="1"/>
+          </p:cNvSpPr>
+          <p:nvPr/>
+        </p:nvSpPr>
+        <p:spPr bwMode="auto">
+          <a:xfrm>
+            <a:off x="304800" y="8001000"/>
+            <a:ext cx="1981200" cy="523220"/>
+          </a:xfrm>
+          <a:prstGeom prst="rect">
+            <a:avLst/>
+          </a:prstGeom>
+          <a:noFill/>
+          <a:ln w="9525">
+            <a:noFill/>
+            <a:miter lim="800000"/>
+            <a:headEnd/>
+            <a:tailEnd/>
+          </a:ln>
+        </p:spPr>
+        <p:txBody>
+          <a:bodyPr wrap="square">
+            <a:spAutoFit/>
+          </a:bodyPr>
+          <a:lstStyle/>
+          <a:p>
+            <a:pPr algn="ctr">
+              <a:spcBef>
+                <a:spcPct val="50000"/>
+              </a:spcBef>
+            </a:pPr>
+            <a:r>
+              <a:rPr lang="en-US" sz="1400" dirty="0" smtClean="0">
+                <a:latin typeface="Calibri" pitchFamily="34" charset="0"/>
+              </a:rPr>
+              <a:t>Model parameter vector space; regularization</a:t>
+            </a:r>
+            <a:endParaRPr lang="en-US" sz="1400" dirty="0">
+              <a:latin typeface="Calibri" pitchFamily="34" charset="0"/>
+            </a:endParaRPr>
+          </a:p>
+        </p:txBody>
+      </p:sp>
+      <p:sp>
+        <p:nvSpPr>
+          <p:cNvPr id="90" name="Text Box 28"/>
+          <p:cNvSpPr txBox="1">
+            <a:spLocks noChangeArrowheads="1"/>
+          </p:cNvSpPr>
+          <p:nvPr/>
+        </p:nvSpPr>
+        <p:spPr bwMode="auto">
+          <a:xfrm>
+            <a:off x="4724400" y="4572000"/>
+            <a:ext cx="1752600" cy="738664"/>
+          </a:xfrm>
+          <a:prstGeom prst="rect">
+            <a:avLst/>
+          </a:prstGeom>
+          <a:noFill/>
+          <a:ln w="9525">
+            <a:noFill/>
+            <a:miter lim="800000"/>
+            <a:headEnd/>
+            <a:tailEnd/>
+          </a:ln>
+        </p:spPr>
+        <p:txBody>
+          <a:bodyPr wrap="square">
+            <a:spAutoFit/>
+          </a:bodyPr>
+          <a:lstStyle/>
+          <a:p>
+            <a:pPr algn="ctr">
+              <a:spcBef>
+                <a:spcPct val="50000"/>
+              </a:spcBef>
+            </a:pPr>
+            <a:r>
+              <a:rPr lang="en-US" sz="1400" dirty="0" smtClean="0">
+                <a:latin typeface="Calibri" pitchFamily="34" charset="0"/>
+              </a:rPr>
+              <a:t>Set sources, BCs, efficiently manage multiple TX</a:t>
+            </a:r>
+            <a:endParaRPr lang="en-US" sz="1400" dirty="0">
+              <a:latin typeface="Calibri" pitchFamily="34" charset="0"/>
+            </a:endParaRPr>
+          </a:p>
+        </p:txBody>
+      </p:sp>
+      <p:sp>
+        <p:nvSpPr>
+          <p:cNvPr id="91" name="Rectangle 90"/>
+          <p:cNvSpPr/>
+          <p:nvPr/>
+        </p:nvSpPr>
+        <p:spPr>
+          <a:xfrm>
+            <a:off x="4600575" y="6705600"/>
+            <a:ext cx="1285929" cy="338554"/>
+          </a:xfrm>
+          <a:prstGeom prst="rect">
+            <a:avLst/>
+          </a:prstGeom>
+        </p:spPr>
+        <p:txBody>
+          <a:bodyPr wrap="none">
+            <a:spAutoFit/>
+          </a:bodyPr>
+          <a:lstStyle/>
+          <a:p>
+            <a:r>
+              <a:rPr lang="en-US" sz="1600" b="1" dirty="0" smtClean="0">
+                <a:latin typeface="Calibri" pitchFamily="34" charset="0"/>
+              </a:rPr>
+              <a:t>Model Map.:</a:t>
+            </a:r>
+            <a:endParaRPr lang="en-US" sz="1600" b="1" dirty="0"/>
+          </a:p>
+        </p:txBody>
+      </p:sp>
+      <p:sp>
+        <p:nvSpPr>
+          <p:cNvPr id="92" name="Rectangle 91"/>
+          <p:cNvSpPr/>
+          <p:nvPr/>
+        </p:nvSpPr>
+        <p:spPr>
+          <a:xfrm>
+            <a:off x="2466975" y="5686425"/>
+            <a:ext cx="1563633" cy="338554"/>
+          </a:xfrm>
+          <a:prstGeom prst="rect">
+            <a:avLst/>
+          </a:prstGeom>
+        </p:spPr>
+        <p:txBody>
+          <a:bodyPr wrap="none">
+            <a:spAutoFit/>
+          </a:bodyPr>
+          <a:lstStyle/>
+          <a:p>
+            <a:r>
+              <a:rPr lang="en-US" sz="1600" b="1" dirty="0" smtClean="0">
+                <a:latin typeface="Calibri" pitchFamily="34" charset="0"/>
+              </a:rPr>
+              <a:t>EM field Interp.:</a:t>
+            </a:r>
+            <a:endParaRPr lang="en-US" sz="1600" b="1" dirty="0"/>
+          </a:p>
+        </p:txBody>
+      </p:sp>
+      <p:sp>
+        <p:nvSpPr>
+          <p:cNvPr id="93" name="Text Box 28"/>
+          <p:cNvSpPr txBox="1">
+            <a:spLocks noChangeArrowheads="1"/>
+          </p:cNvSpPr>
+          <p:nvPr/>
+        </p:nvSpPr>
+        <p:spPr bwMode="auto">
+          <a:xfrm>
+            <a:off x="228600" y="533400"/>
+            <a:ext cx="1981200" cy="523220"/>
+          </a:xfrm>
+          <a:prstGeom prst="rect">
+            <a:avLst/>
+          </a:prstGeom>
+          <a:noFill/>
+          <a:ln w="9525">
+            <a:noFill/>
+            <a:miter lim="800000"/>
+            <a:headEnd/>
+            <a:tailEnd/>
+          </a:ln>
+        </p:spPr>
+        <p:txBody>
+          <a:bodyPr wrap="square">
+            <a:spAutoFit/>
+          </a:bodyPr>
+          <a:lstStyle/>
+          <a:p>
+            <a:pPr algn="ctr">
+              <a:spcBef>
+                <a:spcPct val="50000"/>
+              </a:spcBef>
+            </a:pPr>
+            <a:r>
+              <a:rPr lang="en-US" sz="1400" dirty="0" smtClean="0">
+                <a:latin typeface="Calibri" pitchFamily="34" charset="0"/>
+              </a:rPr>
+              <a:t>Data vector space, organized by TX,RX</a:t>
+            </a:r>
+            <a:endParaRPr lang="en-US" sz="1400" dirty="0">
               <a:latin typeface="Calibri" pitchFamily="34" charset="0"/>
             </a:endParaRPr>
           </a:p>

</xml_diff>